<commit_message>
edit image 2 and add third image to post. edit slide 3 and 2.
</commit_message>
<xml_diff>
--- a/static/briefcase/why_blog-images.pptx
+++ b/static/briefcase/why_blog-images.pptx
@@ -8,6 +8,7 @@
     <p:sldId id="256" r:id="rId2"/>
     <p:sldId id="257" r:id="rId3"/>
     <p:sldId id="258" r:id="rId4"/>
+    <p:sldId id="259" r:id="rId5"/>
   </p:sldIdLst>
   <p:sldSz cx="12192000" cy="6858000"/>
   <p:notesSz cx="6858000" cy="9144000"/>
@@ -3613,40 +3614,10 @@
       </p:grpSpPr>
       <p:pic>
         <p:nvPicPr>
-          <p:cNvPr id="3" name="Picture 2">
-            <a:extLst>
-              <a:ext uri="{FF2B5EF4-FFF2-40B4-BE49-F238E27FC236}">
-                <a16:creationId xmlns:a16="http://schemas.microsoft.com/office/drawing/2014/main" id="{29C52999-3FC3-4020-B1E7-DDF8C819D750}"/>
-              </a:ext>
-            </a:extLst>
-          </p:cNvPr>
-          <p:cNvPicPr>
-            <a:picLocks noChangeAspect="1"/>
-          </p:cNvPicPr>
-          <p:nvPr/>
-        </p:nvPicPr>
-        <p:blipFill>
-          <a:blip r:embed="rId2"/>
-          <a:stretch>
-            <a:fillRect/>
-          </a:stretch>
-        </p:blipFill>
-        <p:spPr>
-          <a:xfrm>
-            <a:off x="385610" y="0"/>
-            <a:ext cx="5061666" cy="4714875"/>
-          </a:xfrm>
-          <a:prstGeom prst="rect">
-            <a:avLst/>
-          </a:prstGeom>
-        </p:spPr>
-      </p:pic>
-      <p:pic>
-        <p:nvPicPr>
-          <p:cNvPr id="4" name="Picture 2" descr="http://127.0.0.1:4321/publications/2019-01-07-why-i-decided-to-publish-data-science-in-a-blog_files/figure-html/unnamed-chunk-3-1.png">
-            <a:extLst>
-              <a:ext uri="{FF2B5EF4-FFF2-40B4-BE49-F238E27FC236}">
-                <a16:creationId xmlns:a16="http://schemas.microsoft.com/office/drawing/2014/main" id="{72443D05-94C0-4AC8-AA7A-33851875EC14}"/>
+          <p:cNvPr id="2050" name="Picture 2" descr="http://127.0.0.1:4321/publications/2019-01-07-why-i-decided-to-publish-data-science-in-a-blog_files/figure-html/unnamed-chunk-3-1.png">
+            <a:extLst>
+              <a:ext uri="{FF2B5EF4-FFF2-40B4-BE49-F238E27FC236}">
+                <a16:creationId xmlns:a16="http://schemas.microsoft.com/office/drawing/2014/main" id="{122A2CA3-B323-469B-A534-A0FCE69D85CF}"/>
               </a:ext>
             </a:extLst>
           </p:cNvPr>
@@ -3655,21 +3626,23 @@
           </p:cNvPicPr>
           <p:nvPr/>
         </p:nvPicPr>
-        <p:blipFill rotWithShape="1">
-          <a:blip r:embed="rId3">
+        <p:blipFill>
+          <a:blip r:embed="rId2">
             <a:extLst>
               <a:ext uri="{28A0092B-C50C-407E-A947-70E740481C1C}">
                 <a14:useLocalDpi xmlns:a14="http://schemas.microsoft.com/office/drawing/2010/main" val="0"/>
               </a:ext>
             </a:extLst>
           </a:blip>
-          <a:srcRect l="19811" t="14299" r="11157" b="7909"/>
-          <a:stretch/>
+          <a:srcRect/>
+          <a:stretch>
+            <a:fillRect/>
+          </a:stretch>
         </p:blipFill>
         <p:spPr bwMode="auto">
           <a:xfrm>
-            <a:off x="1751547" y="4714875"/>
-            <a:ext cx="2620427" cy="2109268"/>
+            <a:off x="1412005" y="4306324"/>
+            <a:ext cx="2780276" cy="2780276"/>
           </a:xfrm>
           <a:prstGeom prst="rect">
             <a:avLst/>
@@ -3686,10 +3659,145 @@
           </a:extLst>
         </p:spPr>
       </p:pic>
+      <p:pic>
+        <p:nvPicPr>
+          <p:cNvPr id="3" name="Picture 2">
+            <a:extLst>
+              <a:ext uri="{FF2B5EF4-FFF2-40B4-BE49-F238E27FC236}">
+                <a16:creationId xmlns:a16="http://schemas.microsoft.com/office/drawing/2014/main" id="{29C52999-3FC3-4020-B1E7-DDF8C819D750}"/>
+              </a:ext>
+            </a:extLst>
+          </p:cNvPr>
+          <p:cNvPicPr>
+            <a:picLocks noChangeAspect="1"/>
+          </p:cNvPicPr>
+          <p:nvPr/>
+        </p:nvPicPr>
+        <p:blipFill>
+          <a:blip r:embed="rId3"/>
+          <a:stretch>
+            <a:fillRect/>
+          </a:stretch>
+        </p:blipFill>
+        <p:spPr>
+          <a:xfrm>
+            <a:off x="385610" y="0"/>
+            <a:ext cx="5061666" cy="4714875"/>
+          </a:xfrm>
+          <a:prstGeom prst="rect">
+            <a:avLst/>
+          </a:prstGeom>
+        </p:spPr>
+      </p:pic>
     </p:spTree>
     <p:extLst>
       <p:ext uri="{BB962C8B-B14F-4D97-AF65-F5344CB8AC3E}">
         <p14:creationId xmlns:p14="http://schemas.microsoft.com/office/powerpoint/2010/main" val="1333841799"/>
+      </p:ext>
+    </p:extLst>
+  </p:cSld>
+  <p:clrMapOvr>
+    <a:masterClrMapping/>
+  </p:clrMapOvr>
+</p:sld>
+</file>
+
+<file path=ppt/slides/slide4.xml><?xml version="1.0" encoding="utf-8"?>
+<p:sld xmlns:a="http://schemas.openxmlformats.org/drawingml/2006/main" xmlns:r="http://schemas.openxmlformats.org/officeDocument/2006/relationships" xmlns:p="http://schemas.openxmlformats.org/presentationml/2006/main">
+  <p:cSld>
+    <p:spTree>
+      <p:nvGrpSpPr>
+        <p:cNvPr id="1" name=""/>
+        <p:cNvGrpSpPr/>
+        <p:nvPr/>
+      </p:nvGrpSpPr>
+      <p:grpSpPr>
+        <a:xfrm>
+          <a:off x="0" y="0"/>
+          <a:ext cx="0" cy="0"/>
+          <a:chOff x="0" y="0"/>
+          <a:chExt cx="0" cy="0"/>
+        </a:xfrm>
+      </p:grpSpPr>
+      <p:pic>
+        <p:nvPicPr>
+          <p:cNvPr id="1026" name="Picture 2" descr="http://127.0.0.1:4321/publications/2019-01-07-why-i-decided-to-publish-data-science-in-a-blog_files/figure-html/unnamed-chunk-4-1.png">
+            <a:extLst>
+              <a:ext uri="{FF2B5EF4-FFF2-40B4-BE49-F238E27FC236}">
+                <a16:creationId xmlns:a16="http://schemas.microsoft.com/office/drawing/2014/main" id="{356054DF-C3D1-43B9-8DE9-B2505191D8EC}"/>
+              </a:ext>
+            </a:extLst>
+          </p:cNvPr>
+          <p:cNvPicPr>
+            <a:picLocks noChangeAspect="1" noChangeArrowheads="1"/>
+          </p:cNvPicPr>
+          <p:nvPr/>
+        </p:nvPicPr>
+        <p:blipFill rotWithShape="1">
+          <a:blip r:embed="rId2">
+            <a:extLst>
+              <a:ext uri="{28A0092B-C50C-407E-A947-70E740481C1C}">
+                <a14:useLocalDpi xmlns:a14="http://schemas.microsoft.com/office/drawing/2010/main" val="0"/>
+              </a:ext>
+            </a:extLst>
+          </a:blip>
+          <a:srcRect l="20486" t="15833" r="12014" b="9166"/>
+          <a:stretch/>
+        </p:blipFill>
+        <p:spPr bwMode="auto">
+          <a:xfrm>
+            <a:off x="1371601" y="4813166"/>
+            <a:ext cx="1828799" cy="2031998"/>
+          </a:xfrm>
+          <a:prstGeom prst="rect">
+            <a:avLst/>
+          </a:prstGeom>
+          <a:noFill/>
+          <a:extLst>
+            <a:ext uri="{909E8E84-426E-40DD-AFC4-6F175D3DCCD1}">
+              <a14:hiddenFill xmlns:a14="http://schemas.microsoft.com/office/drawing/2010/main">
+                <a:solidFill>
+                  <a:srgbClr val="FFFFFF"/>
+                </a:solidFill>
+              </a14:hiddenFill>
+            </a:ext>
+          </a:extLst>
+        </p:spPr>
+      </p:pic>
+      <p:pic>
+        <p:nvPicPr>
+          <p:cNvPr id="2" name="Picture 1">
+            <a:extLst>
+              <a:ext uri="{FF2B5EF4-FFF2-40B4-BE49-F238E27FC236}">
+                <a16:creationId xmlns:a16="http://schemas.microsoft.com/office/drawing/2014/main" id="{FE74320D-8B51-448E-8B92-C79E03CB42AD}"/>
+              </a:ext>
+            </a:extLst>
+          </p:cNvPr>
+          <p:cNvPicPr>
+            <a:picLocks noChangeAspect="1"/>
+          </p:cNvPicPr>
+          <p:nvPr/>
+        </p:nvPicPr>
+        <p:blipFill>
+          <a:blip r:embed="rId3"/>
+          <a:stretch>
+            <a:fillRect/>
+          </a:stretch>
+        </p:blipFill>
+        <p:spPr>
+          <a:xfrm>
+            <a:off x="343651" y="0"/>
+            <a:ext cx="4314074" cy="4813166"/>
+          </a:xfrm>
+          <a:prstGeom prst="rect">
+            <a:avLst/>
+          </a:prstGeom>
+        </p:spPr>
+      </p:pic>
+    </p:spTree>
+    <p:extLst>
+      <p:ext uri="{BB962C8B-B14F-4D97-AF65-F5344CB8AC3E}">
+        <p14:creationId xmlns:p14="http://schemas.microsoft.com/office/powerpoint/2010/main" val="107764466"/>
       </p:ext>
     </p:extLst>
   </p:cSld>

</xml_diff>